<commit_message>
Add images for the README document
</commit_message>
<xml_diff>
--- a/assets/assets-design.pptx
+++ b/assets/assets-design.pptx
@@ -7419,7 +7419,7 @@
               <a:t>Execute the “npm run minify-</a:t>
             </a:r>
             <a:r>
-              <a:rPr lang="en-US" sz="1050" cap="none">
+              <a:rPr lang="en-US" sz="1050" cap="none" dirty="0" err="1">
                 <a:effectLst>
                   <a:glow rad="38100">
                     <a:schemeClr val="bg1">
@@ -7430,7 +7430,7 @@
                   </a:glow>
                 </a:effectLst>
               </a:rPr>
-              <a:t>svg” </a:t>
+              <a:t>svg</a:t>
             </a:r>
             <a:r>
               <a:rPr lang="en-US" sz="1050" cap="none" dirty="0">
@@ -7444,7 +7444,7 @@
                   </a:glow>
                 </a:effectLst>
               </a:rPr>
-              <a:t>command in that terminal, then the “icon.min.svg” will be generated.</a:t>
+              <a:t>” command in that terminal, then the “icon.min.svg” will be generated.</a:t>
             </a:r>
             <a:endParaRPr lang="en-US" sz="1100" cap="none" dirty="0">
               <a:effectLst>

</xml_diff>